<commit_message>
add revised lecture slides
</commit_message>
<xml_diff>
--- a/instructions/FastQC.pptx
+++ b/instructions/FastQC.pptx
@@ -112,6 +112,11 @@
       </a:defRPr>
     </a:lvl9pPr>
   </p:defaultTextStyle>
+  <p:extLst>
+    <p:ext uri="{EFAFB233-063F-42B5-8137-9DF3F51BA10A}">
+      <p15:sldGuideLst xmlns:p15="http://schemas.microsoft.com/office/powerpoint/2012/main"/>
+    </p:ext>
+  </p:extLst>
 </p:presentation>
 </file>
 
@@ -246,7 +251,7 @@
           <a:p>
             <a:fld id="{1CE47332-3B8D-754A-8775-84FD30939A86}" type="datetimeFigureOut">
               <a:rPr lang="en-CH" smtClean="0"/>
-              <a:t>01.03.23</a:t>
+              <a:t>25.03.23</a:t>
             </a:fld>
             <a:endParaRPr lang="en-CH"/>
           </a:p>
@@ -444,7 +449,7 @@
           <a:p>
             <a:fld id="{1CE47332-3B8D-754A-8775-84FD30939A86}" type="datetimeFigureOut">
               <a:rPr lang="en-CH" smtClean="0"/>
-              <a:t>01.03.23</a:t>
+              <a:t>25.03.23</a:t>
             </a:fld>
             <a:endParaRPr lang="en-CH"/>
           </a:p>
@@ -624,7 +629,7 @@
           <a:p>
             <a:fld id="{1CE47332-3B8D-754A-8775-84FD30939A86}" type="datetimeFigureOut">
               <a:rPr lang="en-CH" smtClean="0"/>
-              <a:t>01.03.23</a:t>
+              <a:t>25.03.23</a:t>
             </a:fld>
             <a:endParaRPr lang="en-CH"/>
           </a:p>
@@ -794,7 +799,7 @@
           <a:p>
             <a:fld id="{1CE47332-3B8D-754A-8775-84FD30939A86}" type="datetimeFigureOut">
               <a:rPr lang="en-CH" smtClean="0"/>
-              <a:t>01.03.23</a:t>
+              <a:t>25.03.23</a:t>
             </a:fld>
             <a:endParaRPr lang="en-CH"/>
           </a:p>
@@ -1066,7 +1071,7 @@
           <a:p>
             <a:fld id="{1CE47332-3B8D-754A-8775-84FD30939A86}" type="datetimeFigureOut">
               <a:rPr lang="en-CH" smtClean="0"/>
-              <a:t>01.03.23</a:t>
+              <a:t>25.03.23</a:t>
             </a:fld>
             <a:endParaRPr lang="en-CH"/>
           </a:p>
@@ -1298,7 +1303,7 @@
           <a:p>
             <a:fld id="{1CE47332-3B8D-754A-8775-84FD30939A86}" type="datetimeFigureOut">
               <a:rPr lang="en-CH" smtClean="0"/>
-              <a:t>01.03.23</a:t>
+              <a:t>25.03.23</a:t>
             </a:fld>
             <a:endParaRPr lang="en-CH"/>
           </a:p>
@@ -1665,7 +1670,7 @@
           <a:p>
             <a:fld id="{1CE47332-3B8D-754A-8775-84FD30939A86}" type="datetimeFigureOut">
               <a:rPr lang="en-CH" smtClean="0"/>
-              <a:t>01.03.23</a:t>
+              <a:t>25.03.23</a:t>
             </a:fld>
             <a:endParaRPr lang="en-CH"/>
           </a:p>
@@ -1783,7 +1788,7 @@
           <a:p>
             <a:fld id="{1CE47332-3B8D-754A-8775-84FD30939A86}" type="datetimeFigureOut">
               <a:rPr lang="en-CH" smtClean="0"/>
-              <a:t>01.03.23</a:t>
+              <a:t>25.03.23</a:t>
             </a:fld>
             <a:endParaRPr lang="en-CH"/>
           </a:p>
@@ -1878,7 +1883,7 @@
           <a:p>
             <a:fld id="{1CE47332-3B8D-754A-8775-84FD30939A86}" type="datetimeFigureOut">
               <a:rPr lang="en-CH" smtClean="0"/>
-              <a:t>01.03.23</a:t>
+              <a:t>25.03.23</a:t>
             </a:fld>
             <a:endParaRPr lang="en-CH"/>
           </a:p>
@@ -2155,7 +2160,7 @@
           <a:p>
             <a:fld id="{1CE47332-3B8D-754A-8775-84FD30939A86}" type="datetimeFigureOut">
               <a:rPr lang="en-CH" smtClean="0"/>
-              <a:t>01.03.23</a:t>
+              <a:t>25.03.23</a:t>
             </a:fld>
             <a:endParaRPr lang="en-CH"/>
           </a:p>
@@ -2412,7 +2417,7 @@
           <a:p>
             <a:fld id="{1CE47332-3B8D-754A-8775-84FD30939A86}" type="datetimeFigureOut">
               <a:rPr lang="en-CH" smtClean="0"/>
-              <a:t>01.03.23</a:t>
+              <a:t>25.03.23</a:t>
             </a:fld>
             <a:endParaRPr lang="en-CH"/>
           </a:p>
@@ -2625,7 +2630,7 @@
           <a:p>
             <a:fld id="{1CE47332-3B8D-754A-8775-84FD30939A86}" type="datetimeFigureOut">
               <a:rPr lang="en-CH" smtClean="0"/>
-              <a:t>01.03.23</a:t>
+              <a:t>25.03.23</a:t>
             </a:fld>
             <a:endParaRPr lang="en-CH"/>
           </a:p>
@@ -3193,7 +3198,7 @@
             </a:r>
             <a:r>
               <a:rPr lang="en-CH" sz="3300" b="1" dirty="0"/>
-              <a:t>YourData_March2023 </a:t>
+              <a:t>p29934_March2023 </a:t>
             </a:r>
             <a:r>
               <a:rPr lang="en-CH" dirty="0"/>
@@ -4289,6 +4294,82 @@
           </a:p>
         </p:txBody>
       </p:sp>
+      <p:sp>
+        <p:nvSpPr>
+          <p:cNvPr id="6" name="TextBox 5">
+            <a:extLst>
+              <a:ext uri="{FF2B5EF4-FFF2-40B4-BE49-F238E27FC236}">
+                <a16:creationId xmlns:a16="http://schemas.microsoft.com/office/drawing/2014/main" id="{9BA21E08-5407-28C6-24E3-063435CC717E}"/>
+              </a:ext>
+            </a:extLst>
+          </p:cNvPr>
+          <p:cNvSpPr txBox="1"/>
+          <p:nvPr/>
+        </p:nvSpPr>
+        <p:spPr>
+          <a:xfrm>
+            <a:off x="1343025" y="5554131"/>
+            <a:ext cx="3743325" cy="923330"/>
+          </a:xfrm>
+          <a:prstGeom prst="rect">
+            <a:avLst/>
+          </a:prstGeom>
+          <a:noFill/>
+        </p:spPr>
+        <p:txBody>
+          <a:bodyPr wrap="square" rtlCol="0">
+            <a:spAutoFit/>
+          </a:bodyPr>
+          <a:lstStyle/>
+          <a:p>
+            <a:r>
+              <a:rPr lang="en-CH" dirty="0"/>
+              <a:t>It should automatically select whether the reads are paired end or not but make sure its correct</a:t>
+            </a:r>
+          </a:p>
+        </p:txBody>
+      </p:sp>
+      <p:cxnSp>
+        <p:nvCxnSpPr>
+          <p:cNvPr id="10" name="Straight Arrow Connector 9">
+            <a:extLst>
+              <a:ext uri="{FF2B5EF4-FFF2-40B4-BE49-F238E27FC236}">
+                <a16:creationId xmlns:a16="http://schemas.microsoft.com/office/drawing/2014/main" id="{43CFB4A4-3A6B-79C7-E8F7-F4A3B593C44F}"/>
+              </a:ext>
+            </a:extLst>
+          </p:cNvPr>
+          <p:cNvCxnSpPr>
+            <a:cxnSpLocks/>
+          </p:cNvCxnSpPr>
+          <p:nvPr/>
+        </p:nvCxnSpPr>
+        <p:spPr>
+          <a:xfrm flipH="1" flipV="1">
+            <a:off x="1882044" y="4543425"/>
+            <a:ext cx="1947006" cy="946946"/>
+          </a:xfrm>
+          <a:prstGeom prst="straightConnector1">
+            <a:avLst/>
+          </a:prstGeom>
+          <a:ln>
+            <a:tailEnd type="triangle"/>
+          </a:ln>
+        </p:spPr>
+        <p:style>
+          <a:lnRef idx="1">
+            <a:schemeClr val="accent1"/>
+          </a:lnRef>
+          <a:fillRef idx="0">
+            <a:schemeClr val="accent1"/>
+          </a:fillRef>
+          <a:effectRef idx="0">
+            <a:schemeClr val="accent1"/>
+          </a:effectRef>
+          <a:fontRef idx="minor">
+            <a:schemeClr val="tx1"/>
+          </a:fontRef>
+        </p:style>
+      </p:cxnSp>
     </p:spTree>
     <p:extLst>
       <p:ext uri="{BB962C8B-B14F-4D97-AF65-F5344CB8AC3E}">
@@ -4911,7 +4992,7 @@
         <p:spPr>
           <a:xfrm>
             <a:off x="205280" y="3543300"/>
-            <a:ext cx="2757805" cy="594360"/>
+            <a:ext cx="2757805" cy="1723549"/>
           </a:xfrm>
           <a:prstGeom prst="rect">
             <a:avLst/>
@@ -4938,11 +5019,242 @@
               </a:tabLst>
             </a:pPr>
             <a:r>
+              <a:rPr lang="de-CH" sz="1900" dirty="0" err="1">
+                <a:latin typeface="Times New Roman"/>
+                <a:cs typeface="Times New Roman"/>
+              </a:rPr>
+              <a:t>If</a:t>
+            </a:r>
+            <a:r>
+              <a:rPr lang="de-CH" sz="1900" dirty="0">
+                <a:latin typeface="Times New Roman"/>
+                <a:cs typeface="Times New Roman"/>
+              </a:rPr>
+              <a:t> </a:t>
+            </a:r>
+            <a:r>
+              <a:rPr lang="de-CH" sz="1900" dirty="0" err="1">
+                <a:latin typeface="Times New Roman"/>
+                <a:cs typeface="Times New Roman"/>
+              </a:rPr>
+              <a:t>you</a:t>
+            </a:r>
+            <a:r>
+              <a:rPr lang="de-CH" sz="1900" dirty="0">
+                <a:latin typeface="Times New Roman"/>
+                <a:cs typeface="Times New Roman"/>
+              </a:rPr>
+              <a:t> </a:t>
+            </a:r>
+            <a:r>
+              <a:rPr lang="de-CH" sz="1900" dirty="0" err="1">
+                <a:latin typeface="Times New Roman"/>
+                <a:cs typeface="Times New Roman"/>
+              </a:rPr>
+              <a:t>think</a:t>
+            </a:r>
+            <a:r>
+              <a:rPr lang="de-CH" sz="1900" dirty="0">
+                <a:latin typeface="Times New Roman"/>
+                <a:cs typeface="Times New Roman"/>
+              </a:rPr>
+              <a:t> </a:t>
+            </a:r>
+            <a:r>
+              <a:rPr lang="de-CH" sz="1900" dirty="0" err="1">
+                <a:latin typeface="Times New Roman"/>
+                <a:cs typeface="Times New Roman"/>
+              </a:rPr>
+              <a:t>the</a:t>
+            </a:r>
+            <a:r>
+              <a:rPr lang="de-CH" sz="1900" dirty="0">
+                <a:latin typeface="Times New Roman"/>
+                <a:cs typeface="Times New Roman"/>
+              </a:rPr>
+              <a:t> </a:t>
+            </a:r>
+            <a:r>
+              <a:rPr lang="de-CH" sz="1900" dirty="0" err="1">
+                <a:latin typeface="Times New Roman"/>
+                <a:cs typeface="Times New Roman"/>
+              </a:rPr>
+              <a:t>dataset</a:t>
+            </a:r>
+            <a:r>
+              <a:rPr lang="de-CH" sz="1900" dirty="0">
+                <a:latin typeface="Times New Roman"/>
+                <a:cs typeface="Times New Roman"/>
+              </a:rPr>
+              <a:t> </a:t>
+            </a:r>
+            <a:r>
+              <a:rPr lang="de-CH" sz="1900" dirty="0" err="1">
+                <a:latin typeface="Times New Roman"/>
+                <a:cs typeface="Times New Roman"/>
+              </a:rPr>
+              <a:t>is</a:t>
+            </a:r>
+            <a:r>
+              <a:rPr lang="de-CH" sz="1900" dirty="0">
+                <a:latin typeface="Times New Roman"/>
+                <a:cs typeface="Times New Roman"/>
+              </a:rPr>
+              <a:t> not </a:t>
+            </a:r>
+            <a:r>
+              <a:rPr lang="de-CH" sz="1900" dirty="0" err="1">
+                <a:latin typeface="Times New Roman"/>
+                <a:cs typeface="Times New Roman"/>
+              </a:rPr>
+              <a:t>of</a:t>
+            </a:r>
+            <a:r>
+              <a:rPr lang="de-CH" sz="1900" dirty="0">
+                <a:latin typeface="Times New Roman"/>
+                <a:cs typeface="Times New Roman"/>
+              </a:rPr>
+              <a:t> </a:t>
+            </a:r>
+            <a:r>
+              <a:rPr lang="de-CH" sz="1900" dirty="0" err="1">
+                <a:latin typeface="Times New Roman"/>
+                <a:cs typeface="Times New Roman"/>
+              </a:rPr>
+              <a:t>good</a:t>
+            </a:r>
+            <a:r>
+              <a:rPr lang="de-CH" sz="1900" dirty="0">
+                <a:latin typeface="Times New Roman"/>
+                <a:cs typeface="Times New Roman"/>
+              </a:rPr>
+              <a:t> </a:t>
+            </a:r>
+            <a:r>
+              <a:rPr lang="de-CH" sz="1900" dirty="0" err="1">
+                <a:latin typeface="Times New Roman"/>
+                <a:cs typeface="Times New Roman"/>
+              </a:rPr>
+              <a:t>quality</a:t>
+            </a:r>
+            <a:r>
+              <a:rPr lang="de-CH" sz="1900" dirty="0">
+                <a:latin typeface="Times New Roman"/>
+                <a:cs typeface="Times New Roman"/>
+              </a:rPr>
+              <a:t> at </a:t>
+            </a:r>
+            <a:r>
+              <a:rPr lang="de-CH" sz="1900" dirty="0" err="1">
+                <a:latin typeface="Times New Roman"/>
+                <a:cs typeface="Times New Roman"/>
+              </a:rPr>
+              <a:t>the</a:t>
+            </a:r>
+            <a:r>
+              <a:rPr lang="de-CH" sz="1900" dirty="0">
+                <a:latin typeface="Times New Roman"/>
+                <a:cs typeface="Times New Roman"/>
+              </a:rPr>
+              <a:t> </a:t>
+            </a:r>
+            <a:r>
+              <a:rPr lang="de-CH" sz="1900" dirty="0" err="1">
+                <a:latin typeface="Times New Roman"/>
+                <a:cs typeface="Times New Roman"/>
+              </a:rPr>
+              <a:t>ends</a:t>
+            </a:r>
+            <a:r>
+              <a:rPr lang="de-CH" sz="1900" dirty="0">
+                <a:latin typeface="Times New Roman"/>
+                <a:cs typeface="Times New Roman"/>
+              </a:rPr>
+              <a:t> </a:t>
+            </a:r>
+            <a:r>
+              <a:rPr lang="de-CH" sz="1900" dirty="0" err="1">
+                <a:latin typeface="Times New Roman"/>
+                <a:cs typeface="Times New Roman"/>
+              </a:rPr>
+              <a:t>or</a:t>
+            </a:r>
+            <a:r>
+              <a:rPr lang="de-CH" sz="1900" dirty="0">
+                <a:latin typeface="Times New Roman"/>
+                <a:cs typeface="Times New Roman"/>
+              </a:rPr>
+              <a:t> not </a:t>
+            </a:r>
+            <a:r>
+              <a:rPr lang="de-CH" sz="1900" dirty="0" err="1">
+                <a:latin typeface="Times New Roman"/>
+                <a:cs typeface="Times New Roman"/>
+              </a:rPr>
+              <a:t>overally</a:t>
+            </a:r>
+            <a:r>
+              <a:rPr lang="de-CH" sz="1900" dirty="0">
+                <a:latin typeface="Times New Roman"/>
+                <a:cs typeface="Times New Roman"/>
+              </a:rPr>
+              <a:t> </a:t>
+            </a:r>
+            <a:r>
+              <a:rPr lang="de-CH" sz="1900" dirty="0" err="1">
+                <a:latin typeface="Times New Roman"/>
+                <a:cs typeface="Times New Roman"/>
+              </a:rPr>
+              <a:t>across</a:t>
+            </a:r>
+            <a:r>
+              <a:rPr lang="de-CH" sz="1900" dirty="0">
+                <a:latin typeface="Times New Roman"/>
+                <a:cs typeface="Times New Roman"/>
+              </a:rPr>
+              <a:t> all </a:t>
+            </a:r>
+            <a:r>
+              <a:rPr lang="de-CH" sz="1900" dirty="0" err="1">
+                <a:latin typeface="Times New Roman"/>
+                <a:cs typeface="Times New Roman"/>
+              </a:rPr>
+              <a:t>the</a:t>
+            </a:r>
+            <a:r>
+              <a:rPr lang="de-CH" sz="1900" dirty="0">
+                <a:latin typeface="Times New Roman"/>
+                <a:cs typeface="Times New Roman"/>
+              </a:rPr>
+              <a:t> </a:t>
+            </a:r>
+            <a:r>
+              <a:rPr lang="de-CH" sz="1900" dirty="0" err="1">
+                <a:latin typeface="Times New Roman"/>
+                <a:cs typeface="Times New Roman"/>
+              </a:rPr>
+              <a:t>reads</a:t>
+            </a:r>
+            <a:r>
+              <a:rPr lang="de-CH" sz="1900" dirty="0">
+                <a:latin typeface="Times New Roman"/>
+                <a:cs typeface="Times New Roman"/>
+              </a:rPr>
+              <a:t>, </a:t>
+            </a:r>
+            <a:r>
+              <a:rPr lang="de-CH" sz="1900" dirty="0" err="1">
+                <a:latin typeface="Times New Roman"/>
+                <a:cs typeface="Times New Roman"/>
+              </a:rPr>
+              <a:t>r</a:t>
+            </a:r>
+            <a:r>
               <a:rPr sz="1900" dirty="0">
                 <a:latin typeface="Times New Roman"/>
                 <a:cs typeface="Times New Roman"/>
               </a:rPr>
-              <a:t>Run</a:t>
+              <a:t>un</a:t>
             </a:r>
             <a:r>
               <a:rPr sz="1900" spc="-90" dirty="0">
@@ -5195,6 +5507,41 @@
           </a:p>
         </p:txBody>
       </p:sp>
+      <p:sp>
+        <p:nvSpPr>
+          <p:cNvPr id="2" name="TextBox 1">
+            <a:extLst>
+              <a:ext uri="{FF2B5EF4-FFF2-40B4-BE49-F238E27FC236}">
+                <a16:creationId xmlns:a16="http://schemas.microsoft.com/office/drawing/2014/main" id="{D208B78A-9A50-801E-F104-12328058E89C}"/>
+              </a:ext>
+            </a:extLst>
+          </p:cNvPr>
+          <p:cNvSpPr txBox="1"/>
+          <p:nvPr/>
+        </p:nvSpPr>
+        <p:spPr>
+          <a:xfrm>
+            <a:off x="5463572" y="5983239"/>
+            <a:ext cx="2939074" cy="369332"/>
+          </a:xfrm>
+          <a:prstGeom prst="rect">
+            <a:avLst/>
+          </a:prstGeom>
+          <a:noFill/>
+        </p:spPr>
+        <p:txBody>
+          <a:bodyPr wrap="none" rtlCol="0">
+            <a:spAutoFit/>
+          </a:bodyPr>
+          <a:lstStyle/>
+          <a:p>
+            <a:r>
+              <a:rPr lang="en-CH" dirty="0"/>
+              <a:t>See next page for parameters</a:t>
+            </a:r>
+          </a:p>
+        </p:txBody>
+      </p:sp>
     </p:spTree>
   </p:cSld>
   <p:clrMapOvr>
@@ -5352,7 +5699,7 @@
             </a:pPr>
             <a:r>
               <a:rPr lang="en-US" sz="1100" dirty="0"/>
-              <a:t>Leading: how many bases from the front if they don’t meet quality threshold</a:t>
+              <a:t>Leading: cut how many bases from the front if they don’t meet quality threshold</a:t>
             </a:r>
           </a:p>
           <a:p>
@@ -5368,7 +5715,7 @@
             </a:pPr>
             <a:r>
               <a:rPr lang="en-US" sz="1100" dirty="0"/>
-              <a:t>Trailing: How many bases from the back if they don’t meet quality threshold</a:t>
+              <a:t>Trailing: cut how many bases from the back if they don’t meet quality threshold</a:t>
             </a:r>
           </a:p>
           <a:p>
@@ -5384,7 +5731,7 @@
             </a:pPr>
             <a:r>
               <a:rPr lang="en-US" sz="1100" dirty="0"/>
-              <a:t>Sliding window how many base pairs: what quality</a:t>
+              <a:t>Sliding window windows of how many base pairs: what quality needs to be met</a:t>
             </a:r>
           </a:p>
           <a:p>
@@ -5471,7 +5818,7 @@
         </p:blipFill>
         <p:spPr>
           <a:xfrm>
-            <a:off x="683715" y="3544748"/>
+            <a:off x="4629466" y="3198390"/>
             <a:ext cx="3325091" cy="3291840"/>
           </a:xfrm>
           <a:prstGeom prst="rect">
@@ -5501,7 +5848,7 @@
         </p:blipFill>
         <p:spPr>
           <a:xfrm>
-            <a:off x="4932363" y="3703031"/>
+            <a:off x="237743" y="3084090"/>
             <a:ext cx="3730752" cy="2975274"/>
           </a:xfrm>
           <a:prstGeom prst="rect">
@@ -6043,56 +6390,13 @@
       </p:grpSp>
       <p:sp>
         <p:nvSpPr>
-          <p:cNvPr id="14" name="object 14"/>
-          <p:cNvSpPr txBox="1"/>
-          <p:nvPr/>
-        </p:nvSpPr>
-        <p:spPr>
-          <a:xfrm>
-            <a:off x="342900" y="3619500"/>
-            <a:ext cx="110489" cy="314960"/>
-          </a:xfrm>
-          <a:prstGeom prst="rect">
-            <a:avLst/>
-          </a:prstGeom>
-        </p:spPr>
-        <p:txBody>
-          <a:bodyPr vert="horz" wrap="square" lIns="0" tIns="12700" rIns="0" bIns="0" rtlCol="0">
-            <a:spAutoFit/>
-          </a:bodyPr>
-          <a:lstStyle/>
-          <a:p>
-            <a:pPr marL="12700">
-              <a:lnSpc>
-                <a:spcPct val="100000"/>
-              </a:lnSpc>
-              <a:spcBef>
-                <a:spcPts val="100"/>
-              </a:spcBef>
-            </a:pPr>
-            <a:r>
-              <a:rPr sz="1900" dirty="0">
-                <a:latin typeface="Arial"/>
-                <a:cs typeface="Arial"/>
-              </a:rPr>
-              <a:t>•</a:t>
-            </a:r>
-            <a:endParaRPr sz="1900">
-              <a:latin typeface="Arial"/>
-              <a:cs typeface="Arial"/>
-            </a:endParaRPr>
-          </a:p>
-        </p:txBody>
-      </p:sp>
-      <p:sp>
-        <p:nvSpPr>
           <p:cNvPr id="15" name="object 15"/>
           <p:cNvSpPr txBox="1"/>
           <p:nvPr/>
         </p:nvSpPr>
         <p:spPr>
           <a:xfrm>
-            <a:off x="601420" y="3662515"/>
+            <a:off x="601420" y="3934460"/>
             <a:ext cx="3034030" cy="877163"/>
           </a:xfrm>
           <a:prstGeom prst="rect">
@@ -6105,13 +6409,15 @@
           </a:bodyPr>
           <a:lstStyle/>
           <a:p>
-            <a:pPr marL="12700" marR="5080">
+            <a:pPr marL="355600" marR="5080" indent="-342900">
               <a:lnSpc>
                 <a:spcPts val="2200"/>
               </a:lnSpc>
               <a:spcBef>
                 <a:spcPts val="240"/>
               </a:spcBef>
+              <a:buFont typeface="Arial" panose="020B0604020202020204" pitchFamily="34" charset="0"/>
+              <a:buChar char="•"/>
             </a:pPr>
             <a:r>
               <a:rPr sz="1900" dirty="0">
@@ -6332,13 +6638,13 @@
         </p:nvSpPr>
         <p:spPr>
           <a:xfrm>
-            <a:off x="301796" y="3030205"/>
-            <a:ext cx="3609804" cy="975641"/>
+            <a:off x="601420" y="2920381"/>
+            <a:ext cx="3682209" cy="1085466"/>
           </a:xfrm>
         </p:spPr>
         <p:txBody>
           <a:bodyPr>
-            <a:normAutofit/>
+            <a:normAutofit lnSpcReduction="10000"/>
           </a:bodyPr>
           <a:lstStyle/>
           <a:p>
@@ -6347,7 +6653,7 @@
                 <a:latin typeface="Times New Roman" panose="02020603050405020304" pitchFamily="18" charset="0"/>
                 <a:cs typeface="Times New Roman" panose="02020603050405020304" pitchFamily="18" charset="0"/>
               </a:rPr>
-              <a:t>Scroll to the bottom of the page of the Trimmomatic dataset</a:t>
+              <a:t>Now that you have an edited datataset, scroll to the bottom of the page of the Trimmomatic dataset</a:t>
             </a:r>
           </a:p>
         </p:txBody>

</xml_diff>